<commit_message>
adding nc climate data and ppt updates
</commit_message>
<xml_diff>
--- a/UNC_AI_Bootcamp_Project_3.pptx
+++ b/UNC_AI_Bootcamp_Project_3.pptx
@@ -5,7 +5,7 @@
     <p:sldMasterId id="2147483648" r:id="rId1"/>
   </p:sldMasterIdLst>
   <p:notesMasterIdLst>
-    <p:notesMasterId r:id="rId10"/>
+    <p:notesMasterId r:id="rId11"/>
   </p:notesMasterIdLst>
   <p:sldIdLst>
     <p:sldId id="256" r:id="rId2"/>
@@ -16,6 +16,7 @@
     <p:sldId id="261" r:id="rId7"/>
     <p:sldId id="263" r:id="rId8"/>
     <p:sldId id="268" r:id="rId9"/>
+    <p:sldId id="269" r:id="rId10"/>
   </p:sldIdLst>
   <p:sldSz cx="12192000" cy="6858000"/>
   <p:notesSz cx="6858000" cy="9144000"/>
@@ -131,6 +132,7 @@
         <p14:section name="Reference" id="{1E2AE987-0DB2-41FA-9240-FD4FDFB20167}">
           <p14:sldIdLst>
             <p14:sldId id="268"/>
+            <p14:sldId id="269"/>
           </p14:sldIdLst>
         </p14:section>
       </p14:sectionLst>
@@ -145,7 +147,7 @@
 <file path=ppt/revisionInfo.xml><?xml version="1.0" encoding="utf-8"?>
 <p1510:revInfo xmlns:a="http://schemas.openxmlformats.org/drawingml/2006/main" xmlns:r="http://schemas.openxmlformats.org/officeDocument/2006/relationships" xmlns:p1510="http://schemas.microsoft.com/office/powerpoint/2015/10/main">
   <p1510:revLst>
-    <p1510:client id="{5CC29162-806F-4E99-BB6C-D825E9DCB597}" v="45" dt="2024-08-20T16:48:12.856"/>
+    <p1510:client id="{5CC29162-806F-4E99-BB6C-D825E9DCB597}" v="52" dt="2024-08-20T23:37:20.058"/>
   </p1510:revLst>
 </p1510:revInfo>
 </file>
@@ -155,7 +157,7 @@
   <pc:docChgLst>
     <pc:chgData name="Jamie L Bond" userId="a6e30f513dae4b66" providerId="LiveId" clId="{5CC29162-806F-4E99-BB6C-D825E9DCB597}"/>
     <pc:docChg chg="undo redo custSel addSld delSld modSld addSection modSection">
-      <pc:chgData name="Jamie L Bond" userId="a6e30f513dae4b66" providerId="LiveId" clId="{5CC29162-806F-4E99-BB6C-D825E9DCB597}" dt="2024-08-20T16:48:18.609" v="1577" actId="20577"/>
+      <pc:chgData name="Jamie L Bond" userId="a6e30f513dae4b66" providerId="LiveId" clId="{5CC29162-806F-4E99-BB6C-D825E9DCB597}" dt="2024-08-21T00:19:36.350" v="2224" actId="20577"/>
       <pc:docMkLst>
         <pc:docMk/>
       </pc:docMkLst>
@@ -657,8 +659,8 @@
           </ac:picMkLst>
         </pc:picChg>
       </pc:sldChg>
-      <pc:sldChg chg="addSp delSp modSp mod">
-        <pc:chgData name="Jamie L Bond" userId="a6e30f513dae4b66" providerId="LiveId" clId="{5CC29162-806F-4E99-BB6C-D825E9DCB597}" dt="2024-08-20T16:48:18.609" v="1577" actId="20577"/>
+      <pc:sldChg chg="addSp delSp modSp mod modNotesTx">
+        <pc:chgData name="Jamie L Bond" userId="a6e30f513dae4b66" providerId="LiveId" clId="{5CC29162-806F-4E99-BB6C-D825E9DCB597}" dt="2024-08-20T23:38:52.046" v="2159" actId="1076"/>
         <pc:sldMkLst>
           <pc:docMk/>
           <pc:sldMk cId="3429612716" sldId="267"/>
@@ -680,7 +682,7 @@
           </ac:spMkLst>
         </pc:spChg>
         <pc:spChg chg="add mod">
-          <ac:chgData name="Jamie L Bond" userId="a6e30f513dae4b66" providerId="LiveId" clId="{5CC29162-806F-4E99-BB6C-D825E9DCB597}" dt="2024-08-20T16:45:51.226" v="1531" actId="1076"/>
+          <ac:chgData name="Jamie L Bond" userId="a6e30f513dae4b66" providerId="LiveId" clId="{5CC29162-806F-4E99-BB6C-D825E9DCB597}" dt="2024-08-20T23:37:15.046" v="2031" actId="1076"/>
           <ac:spMkLst>
             <pc:docMk/>
             <pc:sldMk cId="3429612716" sldId="267"/>
@@ -696,11 +698,19 @@
           </ac:spMkLst>
         </pc:spChg>
         <pc:spChg chg="add mod">
-          <ac:chgData name="Jamie L Bond" userId="a6e30f513dae4b66" providerId="LiveId" clId="{5CC29162-806F-4E99-BB6C-D825E9DCB597}" dt="2024-08-20T16:45:48.617" v="1530" actId="1076"/>
+          <ac:chgData name="Jamie L Bond" userId="a6e30f513dae4b66" providerId="LiveId" clId="{5CC29162-806F-4E99-BB6C-D825E9DCB597}" dt="2024-08-20T22:49:56.575" v="1897" actId="1076"/>
           <ac:spMkLst>
             <pc:docMk/>
             <pc:sldMk cId="3429612716" sldId="267"/>
             <ac:spMk id="6" creationId="{93D69420-7FA7-5847-C21A-C7253AD0F3A0}"/>
+          </ac:spMkLst>
+        </pc:spChg>
+        <pc:spChg chg="add mod">
+          <ac:chgData name="Jamie L Bond" userId="a6e30f513dae4b66" providerId="LiveId" clId="{5CC29162-806F-4E99-BB6C-D825E9DCB597}" dt="2024-08-20T23:19:28.185" v="2030" actId="1076"/>
+          <ac:spMkLst>
+            <pc:docMk/>
+            <pc:sldMk cId="3429612716" sldId="267"/>
+            <ac:spMk id="7" creationId="{61AF855E-EC16-A5DF-E876-86AB232207E3}"/>
           </ac:spMkLst>
         </pc:spChg>
         <pc:spChg chg="add del">
@@ -720,7 +730,7 @@
           </ac:spMkLst>
         </pc:spChg>
         <pc:spChg chg="add del mod">
-          <ac:chgData name="Jamie L Bond" userId="a6e30f513dae4b66" providerId="LiveId" clId="{5CC29162-806F-4E99-BB6C-D825E9DCB597}" dt="2024-08-20T16:34:56.434" v="1162" actId="14100"/>
+          <ac:chgData name="Jamie L Bond" userId="a6e30f513dae4b66" providerId="LiveId" clId="{5CC29162-806F-4E99-BB6C-D825E9DCB597}" dt="2024-08-20T23:37:29.966" v="2043" actId="1076"/>
           <ac:spMkLst>
             <pc:docMk/>
             <pc:sldMk cId="3429612716" sldId="267"/>
@@ -728,7 +738,7 @@
           </ac:spMkLst>
         </pc:spChg>
         <pc:spChg chg="add mod">
-          <ac:chgData name="Jamie L Bond" userId="a6e30f513dae4b66" providerId="LiveId" clId="{5CC29162-806F-4E99-BB6C-D825E9DCB597}" dt="2024-08-20T16:46:24.046" v="1536" actId="208"/>
+          <ac:chgData name="Jamie L Bond" userId="a6e30f513dae4b66" providerId="LiveId" clId="{5CC29162-806F-4E99-BB6C-D825E9DCB597}" dt="2024-08-20T22:43:16.859" v="1707" actId="313"/>
           <ac:spMkLst>
             <pc:docMk/>
             <pc:sldMk cId="3429612716" sldId="267"/>
@@ -736,7 +746,7 @@
           </ac:spMkLst>
         </pc:spChg>
         <pc:spChg chg="add mod">
-          <ac:chgData name="Jamie L Bond" userId="a6e30f513dae4b66" providerId="LiveId" clId="{5CC29162-806F-4E99-BB6C-D825E9DCB597}" dt="2024-08-20T16:46:24.046" v="1536" actId="208"/>
+          <ac:chgData name="Jamie L Bond" userId="a6e30f513dae4b66" providerId="LiveId" clId="{5CC29162-806F-4E99-BB6C-D825E9DCB597}" dt="2024-08-20T22:49:37.752" v="1896" actId="20577"/>
           <ac:spMkLst>
             <pc:docMk/>
             <pc:sldMk cId="3429612716" sldId="267"/>
@@ -776,11 +786,51 @@
           </ac:spMkLst>
         </pc:spChg>
         <pc:spChg chg="add mod">
+          <ac:chgData name="Jamie L Bond" userId="a6e30f513dae4b66" providerId="LiveId" clId="{5CC29162-806F-4E99-BB6C-D825E9DCB597}" dt="2024-08-20T22:43:53.045" v="1775" actId="20577"/>
+          <ac:spMkLst>
+            <pc:docMk/>
+            <pc:sldMk cId="3429612716" sldId="267"/>
+            <ac:spMk id="15" creationId="{0FFF3325-E39C-37A9-4D73-F11A96239553}"/>
+          </ac:spMkLst>
+        </pc:spChg>
+        <pc:spChg chg="add mod">
           <ac:chgData name="Jamie L Bond" userId="a6e30f513dae4b66" providerId="LiveId" clId="{5CC29162-806F-4E99-BB6C-D825E9DCB597}" dt="2024-08-20T16:42:21.209" v="1361" actId="1076"/>
           <ac:spMkLst>
             <pc:docMk/>
             <pc:sldMk cId="3429612716" sldId="267"/>
             <ac:spMk id="33" creationId="{B4D39BC6-2DB9-2B88-F43B-38245778FB17}"/>
+          </ac:spMkLst>
+        </pc:spChg>
+        <pc:spChg chg="add mod">
+          <ac:chgData name="Jamie L Bond" userId="a6e30f513dae4b66" providerId="LiveId" clId="{5CC29162-806F-4E99-BB6C-D825E9DCB597}" dt="2024-08-20T22:46:47.163" v="1888" actId="1076"/>
+          <ac:spMkLst>
+            <pc:docMk/>
+            <pc:sldMk cId="3429612716" sldId="267"/>
+            <ac:spMk id="37" creationId="{C49A4477-3E1A-3769-A3EA-0693BEA282C9}"/>
+          </ac:spMkLst>
+        </pc:spChg>
+        <pc:spChg chg="add del mod">
+          <ac:chgData name="Jamie L Bond" userId="a6e30f513dae4b66" providerId="LiveId" clId="{5CC29162-806F-4E99-BB6C-D825E9DCB597}" dt="2024-08-20T22:46:52.431" v="1891" actId="478"/>
+          <ac:spMkLst>
+            <pc:docMk/>
+            <pc:sldMk cId="3429612716" sldId="267"/>
+            <ac:spMk id="38" creationId="{994AE96C-1288-3811-07AE-68558D0555EF}"/>
+          </ac:spMkLst>
+        </pc:spChg>
+        <pc:spChg chg="add mod">
+          <ac:chgData name="Jamie L Bond" userId="a6e30f513dae4b66" providerId="LiveId" clId="{5CC29162-806F-4E99-BB6C-D825E9DCB597}" dt="2024-08-20T22:47:06.233" v="1894" actId="1076"/>
+          <ac:spMkLst>
+            <pc:docMk/>
+            <pc:sldMk cId="3429612716" sldId="267"/>
+            <ac:spMk id="39" creationId="{FEBE0CAE-5D07-FB5E-8BE4-E23E2DFD0E19}"/>
+          </ac:spMkLst>
+        </pc:spChg>
+        <pc:spChg chg="add mod">
+          <ac:chgData name="Jamie L Bond" userId="a6e30f513dae4b66" providerId="LiveId" clId="{5CC29162-806F-4E99-BB6C-D825E9DCB597}" dt="2024-08-20T23:38:52.046" v="2159" actId="1076"/>
+          <ac:spMkLst>
+            <pc:docMk/>
+            <pc:sldMk cId="3429612716" sldId="267"/>
+            <ac:spMk id="46" creationId="{3086BAF5-B145-9E75-5054-FDA4CD5248AF}"/>
           </ac:spMkLst>
         </pc:spChg>
         <pc:spChg chg="add mod">
@@ -792,7 +842,7 @@
           </ac:spMkLst>
         </pc:spChg>
         <pc:spChg chg="add mod">
-          <ac:chgData name="Jamie L Bond" userId="a6e30f513dae4b66" providerId="LiveId" clId="{5CC29162-806F-4E99-BB6C-D825E9DCB597}" dt="2024-08-20T16:47:48.556" v="1562" actId="14861"/>
+          <ac:chgData name="Jamie L Bond" userId="a6e30f513dae4b66" providerId="LiveId" clId="{5CC29162-806F-4E99-BB6C-D825E9DCB597}" dt="2024-08-20T22:46:56.997" v="1892" actId="1076"/>
           <ac:spMkLst>
             <pc:docMk/>
             <pc:sldMk cId="3429612716" sldId="267"/>
@@ -864,7 +914,7 @@
           </ac:picMkLst>
         </pc:picChg>
         <pc:cxnChg chg="add mod">
-          <ac:chgData name="Jamie L Bond" userId="a6e30f513dae4b66" providerId="LiveId" clId="{5CC29162-806F-4E99-BB6C-D825E9DCB597}" dt="2024-08-20T16:42:15.025" v="1360" actId="14100"/>
+          <ac:chgData name="Jamie L Bond" userId="a6e30f513dae4b66" providerId="LiveId" clId="{5CC29162-806F-4E99-BB6C-D825E9DCB597}" dt="2024-08-20T22:46:25.554" v="1863" actId="1076"/>
           <ac:cxnSpMkLst>
             <pc:docMk/>
             <pc:sldMk cId="3429612716" sldId="267"/>
@@ -872,7 +922,7 @@
           </ac:cxnSpMkLst>
         </pc:cxnChg>
         <pc:cxnChg chg="add mod">
-          <ac:chgData name="Jamie L Bond" userId="a6e30f513dae4b66" providerId="LiveId" clId="{5CC29162-806F-4E99-BB6C-D825E9DCB597}" dt="2024-08-20T16:45:48.617" v="1530" actId="1076"/>
+          <ac:chgData name="Jamie L Bond" userId="a6e30f513dae4b66" providerId="LiveId" clId="{5CC29162-806F-4E99-BB6C-D825E9DCB597}" dt="2024-08-20T22:46:25.554" v="1863" actId="1076"/>
           <ac:cxnSpMkLst>
             <pc:docMk/>
             <pc:sldMk cId="3429612716" sldId="267"/>
@@ -880,7 +930,7 @@
           </ac:cxnSpMkLst>
         </pc:cxnChg>
         <pc:cxnChg chg="add mod">
-          <ac:chgData name="Jamie L Bond" userId="a6e30f513dae4b66" providerId="LiveId" clId="{5CC29162-806F-4E99-BB6C-D825E9DCB597}" dt="2024-08-20T16:45:48.617" v="1530" actId="1076"/>
+          <ac:chgData name="Jamie L Bond" userId="a6e30f513dae4b66" providerId="LiveId" clId="{5CC29162-806F-4E99-BB6C-D825E9DCB597}" dt="2024-08-20T22:52:01.212" v="1900" actId="33986"/>
           <ac:cxnSpMkLst>
             <pc:docMk/>
             <pc:sldMk cId="3429612716" sldId="267"/>
@@ -888,11 +938,19 @@
           </ac:cxnSpMkLst>
         </pc:cxnChg>
         <pc:cxnChg chg="add mod">
-          <ac:chgData name="Jamie L Bond" userId="a6e30f513dae4b66" providerId="LiveId" clId="{5CC29162-806F-4E99-BB6C-D825E9DCB597}" dt="2024-08-20T16:45:54.354" v="1532" actId="14100"/>
+          <ac:chgData name="Jamie L Bond" userId="a6e30f513dae4b66" providerId="LiveId" clId="{5CC29162-806F-4E99-BB6C-D825E9DCB597}" dt="2024-08-20T23:37:15.046" v="2031" actId="1076"/>
           <ac:cxnSpMkLst>
             <pc:docMk/>
             <pc:sldMk cId="3429612716" sldId="267"/>
             <ac:cxnSpMk id="23" creationId="{1A7D913F-0EA5-9C4F-5400-BE67FAAC781F}"/>
+          </ac:cxnSpMkLst>
+        </pc:cxnChg>
+        <pc:cxnChg chg="add mod">
+          <ac:chgData name="Jamie L Bond" userId="a6e30f513dae4b66" providerId="LiveId" clId="{5CC29162-806F-4E99-BB6C-D825E9DCB597}" dt="2024-08-20T22:46:25.554" v="1863" actId="1076"/>
+          <ac:cxnSpMkLst>
+            <pc:docMk/>
+            <pc:sldMk cId="3429612716" sldId="267"/>
+            <ac:cxnSpMk id="25" creationId="{4C61D5CB-FA11-364E-F426-1F978FB25653}"/>
           </ac:cxnSpMkLst>
         </pc:cxnChg>
         <pc:cxnChg chg="add mod">
@@ -945,7 +1003,7 @@
         </pc:cxnChg>
       </pc:sldChg>
       <pc:sldChg chg="addSp delSp modSp new mod">
-        <pc:chgData name="Jamie L Bond" userId="a6e30f513dae4b66" providerId="LiveId" clId="{5CC29162-806F-4E99-BB6C-D825E9DCB597}" dt="2024-08-20T15:01:59.228" v="1159" actId="1076"/>
+        <pc:chgData name="Jamie L Bond" userId="a6e30f513dae4b66" providerId="LiveId" clId="{5CC29162-806F-4E99-BB6C-D825E9DCB597}" dt="2024-08-20T23:43:57.760" v="2165" actId="1076"/>
         <pc:sldMkLst>
           <pc:docMk/>
           <pc:sldMk cId="2323337262" sldId="268"/>
@@ -967,7 +1025,7 @@
           </ac:spMkLst>
         </pc:spChg>
         <pc:picChg chg="add mod">
-          <ac:chgData name="Jamie L Bond" userId="a6e30f513dae4b66" providerId="LiveId" clId="{5CC29162-806F-4E99-BB6C-D825E9DCB597}" dt="2024-08-20T15:01:59.228" v="1159" actId="1076"/>
+          <ac:chgData name="Jamie L Bond" userId="a6e30f513dae4b66" providerId="LiveId" clId="{5CC29162-806F-4E99-BB6C-D825E9DCB597}" dt="2024-08-20T23:43:57.760" v="2165" actId="1076"/>
           <ac:picMkLst>
             <pc:docMk/>
             <pc:sldMk cId="2323337262" sldId="268"/>
@@ -975,7 +1033,7 @@
           </ac:picMkLst>
         </pc:picChg>
         <pc:picChg chg="add mod">
-          <ac:chgData name="Jamie L Bond" userId="a6e30f513dae4b66" providerId="LiveId" clId="{5CC29162-806F-4E99-BB6C-D825E9DCB597}" dt="2024-08-20T15:00:09.053" v="1156" actId="14100"/>
+          <ac:chgData name="Jamie L Bond" userId="a6e30f513dae4b66" providerId="LiveId" clId="{5CC29162-806F-4E99-BB6C-D825E9DCB597}" dt="2024-08-20T23:43:38.911" v="2160" actId="1076"/>
           <ac:picMkLst>
             <pc:docMk/>
             <pc:sldMk cId="2323337262" sldId="268"/>
@@ -989,6 +1047,69 @@
           <pc:docMk/>
           <pc:sldMk cId="2645666859" sldId="268"/>
         </pc:sldMkLst>
+      </pc:sldChg>
+      <pc:sldChg chg="addSp delSp modSp add mod">
+        <pc:chgData name="Jamie L Bond" userId="a6e30f513dae4b66" providerId="LiveId" clId="{5CC29162-806F-4E99-BB6C-D825E9DCB597}" dt="2024-08-21T00:19:36.350" v="2224" actId="20577"/>
+        <pc:sldMkLst>
+          <pc:docMk/>
+          <pc:sldMk cId="1967254509" sldId="269"/>
+        </pc:sldMkLst>
+        <pc:spChg chg="mod">
+          <ac:chgData name="Jamie L Bond" userId="a6e30f513dae4b66" providerId="LiveId" clId="{5CC29162-806F-4E99-BB6C-D825E9DCB597}" dt="2024-08-21T00:19:36.350" v="2224" actId="20577"/>
+          <ac:spMkLst>
+            <pc:docMk/>
+            <pc:sldMk cId="1967254509" sldId="269"/>
+            <ac:spMk id="2" creationId="{C338478E-81F3-D229-A83A-5B5EC37298A3}"/>
+          </ac:spMkLst>
+        </pc:spChg>
+        <pc:spChg chg="add del mod">
+          <ac:chgData name="Jamie L Bond" userId="a6e30f513dae4b66" providerId="LiveId" clId="{5CC29162-806F-4E99-BB6C-D825E9DCB597}" dt="2024-08-21T00:19:15.892" v="2173" actId="478"/>
+          <ac:spMkLst>
+            <pc:docMk/>
+            <pc:sldMk cId="1967254509" sldId="269"/>
+            <ac:spMk id="6" creationId="{C774A263-DC95-A99C-BF06-48950010792B}"/>
+          </ac:spMkLst>
+        </pc:spChg>
+        <pc:spChg chg="add mod">
+          <ac:chgData name="Jamie L Bond" userId="a6e30f513dae4b66" providerId="LiveId" clId="{5CC29162-806F-4E99-BB6C-D825E9DCB597}" dt="2024-08-21T00:19:25.463" v="2177" actId="1076"/>
+          <ac:spMkLst>
+            <pc:docMk/>
+            <pc:sldMk cId="1967254509" sldId="269"/>
+            <ac:spMk id="14" creationId="{D160917D-6B4B-6591-8B96-B2C7F9124749}"/>
+          </ac:spMkLst>
+        </pc:spChg>
+        <pc:picChg chg="del">
+          <ac:chgData name="Jamie L Bond" userId="a6e30f513dae4b66" providerId="LiveId" clId="{5CC29162-806F-4E99-BB6C-D825E9DCB597}" dt="2024-08-21T00:19:16.732" v="2174" actId="478"/>
+          <ac:picMkLst>
+            <pc:docMk/>
+            <pc:sldMk cId="1967254509" sldId="269"/>
+            <ac:picMk id="7" creationId="{0F08E826-96A9-2646-108A-C5FE69A3FB6A}"/>
+          </ac:picMkLst>
+        </pc:picChg>
+        <pc:picChg chg="del">
+          <ac:chgData name="Jamie L Bond" userId="a6e30f513dae4b66" providerId="LiveId" clId="{5CC29162-806F-4E99-BB6C-D825E9DCB597}" dt="2024-08-21T00:18:24.267" v="2167" actId="478"/>
+          <ac:picMkLst>
+            <pc:docMk/>
+            <pc:sldMk cId="1967254509" sldId="269"/>
+            <ac:picMk id="9" creationId="{DADB6053-CF02-1C01-93F9-2E1635E6D010}"/>
+          </ac:picMkLst>
+        </pc:picChg>
+        <pc:picChg chg="add del">
+          <ac:chgData name="Jamie L Bond" userId="a6e30f513dae4b66" providerId="LiveId" clId="{5CC29162-806F-4E99-BB6C-D825E9DCB597}" dt="2024-08-21T00:19:12.756" v="2172" actId="478"/>
+          <ac:picMkLst>
+            <pc:docMk/>
+            <pc:sldMk cId="1967254509" sldId="269"/>
+            <ac:picMk id="10" creationId="{627BB062-EBAC-F32B-8C8C-D2B59CFACBA8}"/>
+          </ac:picMkLst>
+        </pc:picChg>
+        <pc:picChg chg="add mod">
+          <ac:chgData name="Jamie L Bond" userId="a6e30f513dae4b66" providerId="LiveId" clId="{5CC29162-806F-4E99-BB6C-D825E9DCB597}" dt="2024-08-21T00:19:09.982" v="2171" actId="14100"/>
+          <ac:picMkLst>
+            <pc:docMk/>
+            <pc:sldMk cId="1967254509" sldId="269"/>
+            <ac:picMk id="12" creationId="{6C8F8E5C-5CF5-5601-CB15-76495AE59FEE}"/>
+          </ac:picMkLst>
+        </pc:picChg>
       </pc:sldChg>
       <pc:sldChg chg="del">
         <pc:chgData name="Jamie L Bond" userId="a6e30f513dae4b66" providerId="LiveId" clId="{5CC29162-806F-4E99-BB6C-D825E9DCB597}" dt="2024-08-20T14:17:10.155" v="309" actId="47"/>
@@ -1539,7 +1660,7 @@
                   <a:srgbClr val="D6A300"/>
                 </a:solidFill>
               </a:rPr>
-              <a:t>PROJECT OBJECTIVE</a:t>
+              <a:t>Model takes precipitation and temperature</a:t>
             </a:r>
           </a:p>
           <a:p>
@@ -1552,10 +1673,11 @@
               </a:spcBef>
               <a:buNone/>
             </a:pPr>
-            <a:r>
-              <a:rPr lang="en-US" dirty="0"/>
-              <a:t>To examine the impacts of extreme weather and climate events on public health and local economy, with a particular emphasis on extreme heat and impacts to North Carolina</a:t>
-            </a:r>
+            <a:endParaRPr lang="en-US" sz="1200" b="1" dirty="0">
+              <a:solidFill>
+                <a:srgbClr val="D6A300"/>
+              </a:solidFill>
+            </a:endParaRPr>
           </a:p>
           <a:p>
             <a:pPr marL="0" indent="0">
@@ -1567,28 +1689,77 @@
               </a:spcBef>
               <a:buNone/>
             </a:pPr>
-            <a:endParaRPr lang="en-US" dirty="0"/>
-          </a:p>
-          <a:p>
-            <a:pPr>
-              <a:spcAft>
-                <a:spcPts val="600"/>
-              </a:spcAft>
-            </a:pPr>
             <a:r>
               <a:rPr lang="en-US" sz="1200" b="1" dirty="0">
                 <a:solidFill>
                   <a:srgbClr val="D6A300"/>
                 </a:solidFill>
               </a:rPr>
-              <a:t>PROJECT OBJECTIVE</a:t>
-            </a:r>
-          </a:p>
-          <a:p>
-            <a:r>
-              <a:rPr lang="en-US" sz="1200" dirty="0"/>
-              <a:t>In this project, the University of North Carolina Charlotte / Chapel Hill AI Bootcamp project team conducted a data analysis to examine the impacts of extreme weather and climate events on public health and local economy, with a particular emphasis on extreme heat and impacts to North Carolina. </a:t>
-            </a:r>
+              <a:t>Find relationships  plant advisor</a:t>
+            </a:r>
+          </a:p>
+          <a:p>
+            <a:pPr marL="0" indent="0">
+              <a:lnSpc>
+                <a:spcPct val="120000"/>
+              </a:lnSpc>
+              <a:spcBef>
+                <a:spcPts val="0"/>
+              </a:spcBef>
+              <a:buNone/>
+            </a:pPr>
+            <a:endParaRPr lang="en-US" sz="1200" b="1" dirty="0">
+              <a:solidFill>
+                <a:srgbClr val="D6A300"/>
+              </a:solidFill>
+            </a:endParaRPr>
+          </a:p>
+          <a:p>
+            <a:pPr marL="0" indent="0">
+              <a:lnSpc>
+                <a:spcPct val="120000"/>
+              </a:lnSpc>
+              <a:spcBef>
+                <a:spcPts val="0"/>
+              </a:spcBef>
+              <a:buNone/>
+            </a:pPr>
+            <a:r>
+              <a:rPr lang="en-US" sz="1200" b="1" dirty="0">
+                <a:solidFill>
+                  <a:srgbClr val="D6A300"/>
+                </a:solidFill>
+              </a:rPr>
+              <a:t>Conditions </a:t>
+            </a:r>
+          </a:p>
+          <a:p>
+            <a:pPr marL="0" indent="0">
+              <a:lnSpc>
+                <a:spcPct val="120000"/>
+              </a:lnSpc>
+              <a:spcBef>
+                <a:spcPts val="0"/>
+              </a:spcBef>
+              <a:buNone/>
+            </a:pPr>
+            <a:endParaRPr lang="en-US" sz="1200" b="1" dirty="0">
+              <a:solidFill>
+                <a:srgbClr val="D6A300"/>
+              </a:solidFill>
+            </a:endParaRPr>
+          </a:p>
+          <a:p>
+            <a:pPr marL="0" indent="0">
+              <a:lnSpc>
+                <a:spcPct val="120000"/>
+              </a:lnSpc>
+              <a:spcBef>
+                <a:spcPts val="0"/>
+              </a:spcBef>
+              <a:buNone/>
+            </a:pPr>
+            <a:endParaRPr lang="en-US" sz="1200" dirty="0"/>
           </a:p>
           <a:p>
             <a:pPr marL="0" indent="0">
@@ -7949,7 +8120,7 @@
         </p:nvSpPr>
         <p:spPr>
           <a:xfrm>
-            <a:off x="838200" y="972457"/>
+            <a:off x="3766372" y="57953"/>
             <a:ext cx="10515600" cy="418646"/>
           </a:xfrm>
         </p:spPr>
@@ -7975,7 +8146,7 @@
         </p:nvSpPr>
         <p:spPr>
           <a:xfrm>
-            <a:off x="1235531" y="1846830"/>
+            <a:off x="460717" y="1894681"/>
             <a:ext cx="733424" cy="505505"/>
           </a:xfrm>
           <a:prstGeom prst="flowChartOnlineStorage">
@@ -8034,7 +8205,7 @@
         </p:nvSpPr>
         <p:spPr>
           <a:xfrm>
-            <a:off x="1235531" y="2552020"/>
+            <a:off x="694194" y="3003437"/>
             <a:ext cx="733424" cy="505505"/>
           </a:xfrm>
           <a:prstGeom prst="flowChartOnlineStorage">
@@ -8109,7 +8280,7 @@
         </p:nvSpPr>
         <p:spPr>
           <a:xfrm>
-            <a:off x="2340430" y="2076450"/>
+            <a:off x="2007225" y="1790812"/>
             <a:ext cx="1266825" cy="704850"/>
           </a:xfrm>
           <a:prstGeom prst="flowChartProcess">
@@ -8151,7 +8322,7 @@
                   <a:schemeClr val="tx1"/>
                 </a:solidFill>
               </a:rPr>
-              <a:t>ML Analysis</a:t>
+              <a:t>Threshold for impact</a:t>
             </a:r>
           </a:p>
         </p:txBody>
@@ -8212,7 +8383,18 @@
                   <a:schemeClr val="tx1"/>
                 </a:solidFill>
               </a:rPr>
-              <a:t>Impact Prediction</a:t>
+              <a:t>Good year or </a:t>
+            </a:r>
+          </a:p>
+          <a:p>
+            <a:pPr algn="ctr"/>
+            <a:r>
+              <a:rPr lang="en-US" sz="1100" dirty="0">
+                <a:solidFill>
+                  <a:schemeClr val="tx1"/>
+                </a:solidFill>
+              </a:rPr>
+              <a:t>Bad Year </a:t>
             </a:r>
           </a:p>
         </p:txBody>
@@ -8542,58 +8724,15 @@
           </p:cNvPr>
           <p:cNvCxnSpPr>
             <a:cxnSpLocks/>
-            <a:stCxn id="9" idx="3"/>
+            <a:stCxn id="15" idx="3"/>
             <a:endCxn id="10" idx="1"/>
           </p:cNvCxnSpPr>
           <p:nvPr/>
         </p:nvCxnSpPr>
         <p:spPr>
           <a:xfrm flipV="1">
-            <a:off x="3607255" y="2419350"/>
-            <a:ext cx="409574" cy="9525"/>
-          </a:xfrm>
-          <a:prstGeom prst="straightConnector1">
-            <a:avLst/>
-          </a:prstGeom>
-          <a:ln>
-            <a:tailEnd type="triangle"/>
-          </a:ln>
-        </p:spPr>
-        <p:style>
-          <a:lnRef idx="2">
-            <a:schemeClr val="accent1"/>
-          </a:lnRef>
-          <a:fillRef idx="0">
-            <a:schemeClr val="accent1"/>
-          </a:fillRef>
-          <a:effectRef idx="1">
-            <a:schemeClr val="accent1"/>
-          </a:effectRef>
-          <a:fontRef idx="minor">
-            <a:schemeClr val="tx1"/>
-          </a:fontRef>
-        </p:style>
-      </p:cxnSp>
-      <p:cxnSp>
-        <p:nvCxnSpPr>
-          <p:cNvPr id="20" name="Straight Arrow Connector 15">
-            <a:extLst>
-              <a:ext uri="{FF2B5EF4-FFF2-40B4-BE49-F238E27FC236}">
-                <a16:creationId xmlns:a16="http://schemas.microsoft.com/office/drawing/2014/main" id="{AFCD9846-8F3C-9E04-444C-0CED8451BA73}"/>
-              </a:ext>
-            </a:extLst>
-          </p:cNvPr>
-          <p:cNvCxnSpPr>
-            <a:cxnSpLocks/>
-            <a:stCxn id="6" idx="3"/>
-            <a:endCxn id="9" idx="1"/>
-          </p:cNvCxnSpPr>
-          <p:nvPr/>
-        </p:nvCxnSpPr>
-        <p:spPr>
-          <a:xfrm flipV="1">
-            <a:off x="1846718" y="2428875"/>
-            <a:ext cx="493712" cy="375898"/>
+            <a:off x="3213841" y="2419350"/>
+            <a:ext cx="802988" cy="836840"/>
           </a:xfrm>
           <a:prstGeom prst="bentConnector3">
             <a:avLst>
@@ -8621,6 +8760,49 @@
       </p:cxnSp>
       <p:cxnSp>
         <p:nvCxnSpPr>
+          <p:cNvPr id="20" name="Straight Arrow Connector 15">
+            <a:extLst>
+              <a:ext uri="{FF2B5EF4-FFF2-40B4-BE49-F238E27FC236}">
+                <a16:creationId xmlns:a16="http://schemas.microsoft.com/office/drawing/2014/main" id="{AFCD9846-8F3C-9E04-444C-0CED8451BA73}"/>
+              </a:ext>
+            </a:extLst>
+          </p:cNvPr>
+          <p:cNvCxnSpPr>
+            <a:cxnSpLocks/>
+            <a:stCxn id="6" idx="3"/>
+            <a:endCxn id="15" idx="1"/>
+          </p:cNvCxnSpPr>
+          <p:nvPr/>
+        </p:nvCxnSpPr>
+        <p:spPr>
+          <a:xfrm>
+            <a:off x="1305381" y="3256190"/>
+            <a:ext cx="641635" cy="0"/>
+          </a:xfrm>
+          <a:prstGeom prst="straightConnector1">
+            <a:avLst/>
+          </a:prstGeom>
+          <a:ln>
+            <a:tailEnd type="triangle"/>
+          </a:ln>
+        </p:spPr>
+        <p:style>
+          <a:lnRef idx="2">
+            <a:schemeClr val="accent1"/>
+          </a:lnRef>
+          <a:fillRef idx="0">
+            <a:schemeClr val="accent1"/>
+          </a:fillRef>
+          <a:effectRef idx="1">
+            <a:schemeClr val="accent1"/>
+          </a:effectRef>
+          <a:fontRef idx="minor">
+            <a:schemeClr val="tx1"/>
+          </a:fontRef>
+        </p:style>
+      </p:cxnSp>
+      <p:cxnSp>
+        <p:nvCxnSpPr>
           <p:cNvPr id="23" name="Straight Arrow Connector 15">
             <a:extLst>
               <a:ext uri="{FF2B5EF4-FFF2-40B4-BE49-F238E27FC236}">
@@ -8636,14 +8818,12 @@
           <p:nvPr/>
         </p:nvCxnSpPr>
         <p:spPr>
-          <a:xfrm>
-            <a:off x="1846718" y="2099583"/>
-            <a:ext cx="493712" cy="329292"/>
+          <a:xfrm flipV="1">
+            <a:off x="1071904" y="2143237"/>
+            <a:ext cx="935321" cy="4197"/>
           </a:xfrm>
-          <a:prstGeom prst="bentConnector3">
-            <a:avLst>
-              <a:gd name="adj1" fmla="val 50000"/>
-            </a:avLst>
+          <a:prstGeom prst="straightConnector1">
+            <a:avLst/>
           </a:prstGeom>
           <a:ln>
             <a:tailEnd type="triangle"/>
@@ -9024,7 +9204,7 @@
         </p:nvSpPr>
         <p:spPr>
           <a:xfrm>
-            <a:off x="2369005" y="1809126"/>
+            <a:off x="2443590" y="1544300"/>
             <a:ext cx="465138" cy="324870"/>
           </a:xfrm>
           <a:prstGeom prst="ellipse">
@@ -9284,6 +9464,303 @@
                 <a:schemeClr val="bg1"/>
               </a:solidFill>
             </a:endParaRPr>
+          </a:p>
+        </p:txBody>
+      </p:sp>
+      <p:sp>
+        <p:nvSpPr>
+          <p:cNvPr id="7" name="TextBox 6">
+            <a:extLst>
+              <a:ext uri="{FF2B5EF4-FFF2-40B4-BE49-F238E27FC236}">
+                <a16:creationId xmlns:a16="http://schemas.microsoft.com/office/drawing/2014/main" id="{61AF855E-EC16-A5DF-E876-86AB232207E3}"/>
+              </a:ext>
+            </a:extLst>
+          </p:cNvPr>
+          <p:cNvSpPr txBox="1"/>
+          <p:nvPr/>
+        </p:nvSpPr>
+        <p:spPr>
+          <a:xfrm>
+            <a:off x="6119812" y="1729809"/>
+            <a:ext cx="1266825" cy="523220"/>
+          </a:xfrm>
+          <a:prstGeom prst="rect">
+            <a:avLst/>
+          </a:prstGeom>
+          <a:noFill/>
+        </p:spPr>
+        <p:txBody>
+          <a:bodyPr wrap="square" rtlCol="0">
+            <a:spAutoFit/>
+          </a:bodyPr>
+          <a:lstStyle/>
+          <a:p>
+            <a:r>
+              <a:rPr lang="en-US" sz="1400" dirty="0"/>
+              <a:t>Commodity Trader</a:t>
+            </a:r>
+          </a:p>
+        </p:txBody>
+      </p:sp>
+      <p:sp>
+        <p:nvSpPr>
+          <p:cNvPr id="15" name="Flowchart: Process 14">
+            <a:extLst>
+              <a:ext uri="{FF2B5EF4-FFF2-40B4-BE49-F238E27FC236}">
+                <a16:creationId xmlns:a16="http://schemas.microsoft.com/office/drawing/2014/main" id="{0FFF3325-E39C-37A9-4D73-F11A96239553}"/>
+              </a:ext>
+            </a:extLst>
+          </p:cNvPr>
+          <p:cNvSpPr/>
+          <p:nvPr/>
+        </p:nvSpPr>
+        <p:spPr>
+          <a:xfrm>
+            <a:off x="1947016" y="2903765"/>
+            <a:ext cx="1266825" cy="704850"/>
+          </a:xfrm>
+          <a:prstGeom prst="flowChartProcess">
+            <a:avLst/>
+          </a:prstGeom>
+          <a:solidFill>
+            <a:srgbClr val="F2F2BD"/>
+          </a:solidFill>
+          <a:ln w="3175">
+            <a:solidFill>
+              <a:schemeClr val="tx1"/>
+            </a:solidFill>
+          </a:ln>
+        </p:spPr>
+        <p:style>
+          <a:lnRef idx="2">
+            <a:schemeClr val="accent1">
+              <a:shade val="15000"/>
+            </a:schemeClr>
+          </a:lnRef>
+          <a:fillRef idx="1">
+            <a:schemeClr val="accent1"/>
+          </a:fillRef>
+          <a:effectRef idx="0">
+            <a:schemeClr val="accent1"/>
+          </a:effectRef>
+          <a:fontRef idx="minor">
+            <a:schemeClr val="lt1"/>
+          </a:fontRef>
+        </p:style>
+        <p:txBody>
+          <a:bodyPr rtlCol="0" anchor="ctr"/>
+          <a:lstStyle/>
+          <a:p>
+            <a:pPr algn="ctr"/>
+            <a:r>
+              <a:rPr lang="en-US" sz="1100" dirty="0">
+                <a:solidFill>
+                  <a:schemeClr val="tx1"/>
+                </a:solidFill>
+              </a:rPr>
+              <a:t>Trend/probability of future conditions</a:t>
+            </a:r>
+          </a:p>
+        </p:txBody>
+      </p:sp>
+      <p:cxnSp>
+        <p:nvCxnSpPr>
+          <p:cNvPr id="25" name="Straight Arrow Connector 15">
+            <a:extLst>
+              <a:ext uri="{FF2B5EF4-FFF2-40B4-BE49-F238E27FC236}">
+                <a16:creationId xmlns:a16="http://schemas.microsoft.com/office/drawing/2014/main" id="{4C61D5CB-FA11-364E-F426-1F978FB25653}"/>
+              </a:ext>
+            </a:extLst>
+          </p:cNvPr>
+          <p:cNvCxnSpPr>
+            <a:cxnSpLocks/>
+            <a:stCxn id="9" idx="3"/>
+            <a:endCxn id="10" idx="1"/>
+          </p:cNvCxnSpPr>
+          <p:nvPr/>
+        </p:nvCxnSpPr>
+        <p:spPr>
+          <a:xfrm>
+            <a:off x="3274050" y="2143237"/>
+            <a:ext cx="742779" cy="276113"/>
+          </a:xfrm>
+          <a:prstGeom prst="bentConnector3">
+            <a:avLst>
+              <a:gd name="adj1" fmla="val 43588"/>
+            </a:avLst>
+          </a:prstGeom>
+          <a:ln>
+            <a:tailEnd type="triangle"/>
+          </a:ln>
+        </p:spPr>
+        <p:style>
+          <a:lnRef idx="2">
+            <a:schemeClr val="accent1"/>
+          </a:lnRef>
+          <a:fillRef idx="0">
+            <a:schemeClr val="accent1"/>
+          </a:fillRef>
+          <a:effectRef idx="1">
+            <a:schemeClr val="accent1"/>
+          </a:effectRef>
+          <a:fontRef idx="minor">
+            <a:schemeClr val="tx1"/>
+          </a:fontRef>
+        </p:style>
+      </p:cxnSp>
+      <p:sp>
+        <p:nvSpPr>
+          <p:cNvPr id="37" name="TextBox 36">
+            <a:extLst>
+              <a:ext uri="{FF2B5EF4-FFF2-40B4-BE49-F238E27FC236}">
+                <a16:creationId xmlns:a16="http://schemas.microsoft.com/office/drawing/2014/main" id="{C49A4477-3E1A-3769-A3EA-0693BEA282C9}"/>
+              </a:ext>
+            </a:extLst>
+          </p:cNvPr>
+          <p:cNvSpPr txBox="1"/>
+          <p:nvPr/>
+        </p:nvSpPr>
+        <p:spPr>
+          <a:xfrm>
+            <a:off x="6148302" y="2251040"/>
+            <a:ext cx="1266825" cy="523220"/>
+          </a:xfrm>
+          <a:prstGeom prst="rect">
+            <a:avLst/>
+          </a:prstGeom>
+          <a:noFill/>
+        </p:spPr>
+        <p:txBody>
+          <a:bodyPr wrap="square" rtlCol="0">
+            <a:spAutoFit/>
+          </a:bodyPr>
+          <a:lstStyle/>
+          <a:p>
+            <a:r>
+              <a:rPr lang="en-US" sz="1400" dirty="0"/>
+              <a:t>Farmer for planning</a:t>
+            </a:r>
+          </a:p>
+        </p:txBody>
+      </p:sp>
+      <p:sp>
+        <p:nvSpPr>
+          <p:cNvPr id="39" name="Oval 38">
+            <a:extLst>
+              <a:ext uri="{FF2B5EF4-FFF2-40B4-BE49-F238E27FC236}">
+                <a16:creationId xmlns:a16="http://schemas.microsoft.com/office/drawing/2014/main" id="{FEBE0CAE-5D07-FB5E-8BE4-E23E2DFD0E19}"/>
+              </a:ext>
+            </a:extLst>
+          </p:cNvPr>
+          <p:cNvSpPr/>
+          <p:nvPr/>
+        </p:nvSpPr>
+        <p:spPr>
+          <a:xfrm>
+            <a:off x="2892656" y="3558437"/>
+            <a:ext cx="465138" cy="324870"/>
+          </a:xfrm>
+          <a:prstGeom prst="ellipse">
+            <a:avLst/>
+          </a:prstGeom>
+          <a:solidFill>
+            <a:schemeClr val="accent6"/>
+          </a:solidFill>
+          <a:ln w="3175">
+            <a:solidFill>
+              <a:schemeClr val="bg1"/>
+            </a:solidFill>
+          </a:ln>
+          <a:effectLst>
+            <a:outerShdw blurRad="63500" sx="102000" sy="102000" algn="ctr" rotWithShape="0">
+              <a:prstClr val="black">
+                <a:alpha val="40000"/>
+              </a:prstClr>
+            </a:outerShdw>
+          </a:effectLst>
+        </p:spPr>
+        <p:style>
+          <a:lnRef idx="2">
+            <a:schemeClr val="accent1">
+              <a:shade val="15000"/>
+            </a:schemeClr>
+          </a:lnRef>
+          <a:fillRef idx="1">
+            <a:schemeClr val="accent1"/>
+          </a:fillRef>
+          <a:effectRef idx="0">
+            <a:schemeClr val="accent1"/>
+          </a:effectRef>
+          <a:fontRef idx="minor">
+            <a:schemeClr val="lt1"/>
+          </a:fontRef>
+        </p:style>
+        <p:txBody>
+          <a:bodyPr wrap="none" lIns="0" tIns="0" rIns="0" bIns="0" rtlCol="0" anchor="ctr"/>
+          <a:lstStyle/>
+          <a:p>
+            <a:pPr algn="ctr"/>
+            <a:r>
+              <a:rPr lang="en-US" sz="1100" dirty="0">
+                <a:solidFill>
+                  <a:schemeClr val="bg1"/>
+                </a:solidFill>
+              </a:rPr>
+              <a:t>ML</a:t>
+            </a:r>
+          </a:p>
+        </p:txBody>
+      </p:sp>
+      <p:sp>
+        <p:nvSpPr>
+          <p:cNvPr id="46" name="TextBox 45">
+            <a:extLst>
+              <a:ext uri="{FF2B5EF4-FFF2-40B4-BE49-F238E27FC236}">
+                <a16:creationId xmlns:a16="http://schemas.microsoft.com/office/drawing/2014/main" id="{3086BAF5-B145-9E75-5054-FDA4CD5248AF}"/>
+              </a:ext>
+            </a:extLst>
+          </p:cNvPr>
+          <p:cNvSpPr txBox="1"/>
+          <p:nvPr/>
+        </p:nvSpPr>
+        <p:spPr>
+          <a:xfrm>
+            <a:off x="295018" y="4297346"/>
+            <a:ext cx="3146256" cy="1169551"/>
+          </a:xfrm>
+          <a:prstGeom prst="rect">
+            <a:avLst/>
+          </a:prstGeom>
+          <a:noFill/>
+        </p:spPr>
+        <p:txBody>
+          <a:bodyPr wrap="square" rtlCol="0">
+            <a:spAutoFit/>
+          </a:bodyPr>
+          <a:lstStyle/>
+          <a:p>
+            <a:r>
+              <a:rPr lang="en-US" sz="1400" dirty="0"/>
+              <a:t>Features: precipitation, temp</a:t>
+            </a:r>
+          </a:p>
+          <a:p>
+            <a:endParaRPr lang="en-US" sz="1400" dirty="0"/>
+          </a:p>
+          <a:p>
+            <a:r>
+              <a:rPr lang="en-US" sz="1400" dirty="0"/>
+              <a:t>Target: yield</a:t>
+            </a:r>
+          </a:p>
+          <a:p>
+            <a:endParaRPr lang="en-US" sz="1400" dirty="0"/>
+          </a:p>
+          <a:p>
+            <a:r>
+              <a:rPr lang="en-US" sz="1400" dirty="0"/>
+              <a:t> </a:t>
+            </a:r>
           </a:p>
         </p:txBody>
       </p:sp>
@@ -10206,7 +10683,7 @@
         </p:blipFill>
         <p:spPr>
           <a:xfrm>
-            <a:off x="263452" y="607787"/>
+            <a:off x="492052" y="633186"/>
             <a:ext cx="7540942" cy="4103914"/>
           </a:xfrm>
         </p:spPr>
@@ -10291,7 +10768,7 @@
         </p:blipFill>
         <p:spPr>
           <a:xfrm>
-            <a:off x="6128656" y="2579391"/>
+            <a:off x="8032994" y="783772"/>
             <a:ext cx="5933836" cy="3645423"/>
           </a:xfrm>
           <a:prstGeom prst="rect">
@@ -10303,6 +10780,194 @@
     <p:extLst>
       <p:ext uri="{BB962C8B-B14F-4D97-AF65-F5344CB8AC3E}">
         <p14:creationId xmlns:p14="http://schemas.microsoft.com/office/powerpoint/2010/main" val="2323337262"/>
+      </p:ext>
+    </p:extLst>
+  </p:cSld>
+  <p:clrMapOvr>
+    <a:masterClrMapping/>
+  </p:clrMapOvr>
+</p:sld>
+</file>
+
+<file path=ppt/slides/slide9.xml><?xml version="1.0" encoding="utf-8"?>
+<p:sld xmlns:a="http://schemas.openxmlformats.org/drawingml/2006/main" xmlns:r="http://schemas.openxmlformats.org/officeDocument/2006/relationships" xmlns:p="http://schemas.openxmlformats.org/presentationml/2006/main">
+  <p:cSld>
+    <p:spTree>
+      <p:nvGrpSpPr>
+        <p:cNvPr id="1" name=""/>
+        <p:cNvGrpSpPr/>
+        <p:nvPr/>
+      </p:nvGrpSpPr>
+      <p:grpSpPr>
+        <a:xfrm>
+          <a:off x="0" y="0"/>
+          <a:ext cx="0" cy="0"/>
+          <a:chOff x="0" y="0"/>
+          <a:chExt cx="0" cy="0"/>
+        </a:xfrm>
+      </p:grpSpPr>
+      <p:sp>
+        <p:nvSpPr>
+          <p:cNvPr id="2" name="Title 1">
+            <a:extLst>
+              <a:ext uri="{FF2B5EF4-FFF2-40B4-BE49-F238E27FC236}">
+                <a16:creationId xmlns:a16="http://schemas.microsoft.com/office/drawing/2014/main" id="{C338478E-81F3-D229-A83A-5B5EC37298A3}"/>
+              </a:ext>
+            </a:extLst>
+          </p:cNvPr>
+          <p:cNvSpPr>
+            <a:spLocks noGrp="1"/>
+          </p:cNvSpPr>
+          <p:nvPr>
+            <p:ph type="title"/>
+          </p:nvPr>
+        </p:nvSpPr>
+        <p:spPr/>
+        <p:txBody>
+          <a:bodyPr>
+            <a:normAutofit fontScale="90000"/>
+          </a:bodyPr>
+          <a:lstStyle/>
+          <a:p>
+            <a:r>
+              <a:rPr lang="en-US" dirty="0"/>
+              <a:t>Precipitation and </a:t>
+            </a:r>
+            <a:r>
+              <a:rPr lang="en-US"/>
+              <a:t>Temperature Data Source</a:t>
+            </a:r>
+            <a:endParaRPr lang="en-US" dirty="0"/>
+          </a:p>
+        </p:txBody>
+      </p:sp>
+      <p:sp>
+        <p:nvSpPr>
+          <p:cNvPr id="4" name="Footer Placeholder 3">
+            <a:extLst>
+              <a:ext uri="{FF2B5EF4-FFF2-40B4-BE49-F238E27FC236}">
+                <a16:creationId xmlns:a16="http://schemas.microsoft.com/office/drawing/2014/main" id="{49C27036-73E7-7E87-80C2-6A1F2CB7BA67}"/>
+              </a:ext>
+            </a:extLst>
+          </p:cNvPr>
+          <p:cNvSpPr>
+            <a:spLocks noGrp="1"/>
+          </p:cNvSpPr>
+          <p:nvPr>
+            <p:ph type="ftr" sz="quarter" idx="11"/>
+          </p:nvPr>
+        </p:nvSpPr>
+        <p:spPr/>
+        <p:txBody>
+          <a:bodyPr/>
+          <a:lstStyle/>
+          <a:p>
+            <a:r>
+              <a:rPr lang="en-US"/>
+              <a:t>UNC AI Bootcamp | MOD 10 Project | Contributors: Jamie Bond, Mike Szumski, Rajesh Velamala</a:t>
+            </a:r>
+          </a:p>
+        </p:txBody>
+      </p:sp>
+      <p:sp>
+        <p:nvSpPr>
+          <p:cNvPr id="5" name="Slide Number Placeholder 4">
+            <a:extLst>
+              <a:ext uri="{FF2B5EF4-FFF2-40B4-BE49-F238E27FC236}">
+                <a16:creationId xmlns:a16="http://schemas.microsoft.com/office/drawing/2014/main" id="{7221C47B-F124-E1B6-BC33-2151223104B2}"/>
+              </a:ext>
+            </a:extLst>
+          </p:cNvPr>
+          <p:cNvSpPr>
+            <a:spLocks noGrp="1"/>
+          </p:cNvSpPr>
+          <p:nvPr>
+            <p:ph type="sldNum" sz="quarter" idx="12"/>
+          </p:nvPr>
+        </p:nvSpPr>
+        <p:spPr/>
+        <p:txBody>
+          <a:bodyPr/>
+          <a:lstStyle/>
+          <a:p>
+            <a:fld id="{79F31F10-1257-482C-8051-E7DF71AF7482}" type="slidenum">
+              <a:rPr lang="en-US" smtClean="0"/>
+              <a:pPr/>
+              <a:t>9</a:t>
+            </a:fld>
+            <a:endParaRPr lang="en-US" dirty="0"/>
+          </a:p>
+        </p:txBody>
+      </p:sp>
+      <p:pic>
+        <p:nvPicPr>
+          <p:cNvPr id="12" name="Picture 11">
+            <a:extLst>
+              <a:ext uri="{FF2B5EF4-FFF2-40B4-BE49-F238E27FC236}">
+                <a16:creationId xmlns:a16="http://schemas.microsoft.com/office/drawing/2014/main" id="{6C8F8E5C-5CF5-5601-CB15-76495AE59FEE}"/>
+              </a:ext>
+            </a:extLst>
+          </p:cNvPr>
+          <p:cNvPicPr>
+            <a:picLocks noChangeAspect="1"/>
+          </p:cNvPicPr>
+          <p:nvPr/>
+        </p:nvPicPr>
+        <p:blipFill>
+          <a:blip r:embed="rId2"/>
+          <a:stretch>
+            <a:fillRect/>
+          </a:stretch>
+        </p:blipFill>
+        <p:spPr>
+          <a:xfrm>
+            <a:off x="1228344" y="1790017"/>
+            <a:ext cx="4670178" cy="5204507"/>
+          </a:xfrm>
+          <a:prstGeom prst="rect">
+            <a:avLst/>
+          </a:prstGeom>
+        </p:spPr>
+      </p:pic>
+      <p:sp>
+        <p:nvSpPr>
+          <p:cNvPr id="14" name="TextBox 13">
+            <a:extLst>
+              <a:ext uri="{FF2B5EF4-FFF2-40B4-BE49-F238E27FC236}">
+                <a16:creationId xmlns:a16="http://schemas.microsoft.com/office/drawing/2014/main" id="{D160917D-6B4B-6591-8B96-B2C7F9124749}"/>
+              </a:ext>
+            </a:extLst>
+          </p:cNvPr>
+          <p:cNvSpPr txBox="1"/>
+          <p:nvPr/>
+        </p:nvSpPr>
+        <p:spPr>
+          <a:xfrm>
+            <a:off x="6800304" y="1900535"/>
+            <a:ext cx="3566160" cy="1200329"/>
+          </a:xfrm>
+          <a:prstGeom prst="rect">
+            <a:avLst/>
+          </a:prstGeom>
+          <a:noFill/>
+        </p:spPr>
+        <p:txBody>
+          <a:bodyPr wrap="square">
+            <a:spAutoFit/>
+          </a:bodyPr>
+          <a:lstStyle/>
+          <a:p>
+            <a:r>
+              <a:rPr lang="en-US" dirty="0"/>
+              <a:t>https://public.tableau.com/app/profile/north.carolina.state.climate.office/viz/SEClimateTrendAnalysisTool/TrendAnalysisTool</a:t>
+            </a:r>
+          </a:p>
+        </p:txBody>
+      </p:sp>
+    </p:spTree>
+    <p:extLst>
+      <p:ext uri="{BB962C8B-B14F-4D97-AF65-F5344CB8AC3E}">
+        <p14:creationId xmlns:p14="http://schemas.microsoft.com/office/powerpoint/2010/main" val="1967254509"/>
       </p:ext>
     </p:extLst>
   </p:cSld>

</xml_diff>